<commit_message>
Merged PR 1010: Second round of strategy/content edits for Physical Hierarchy
This branch is intended to be used June-July 2018 to make the Physical Hierarchy documentation ready for consumption.
</commit_message>
<xml_diff>
--- a/docs/core/bis/intro/media/physical-hierarchy-organization-source.pptx
+++ b/docs/core/bis/intro/media/physical-hierarchy-organization-source.pptx
@@ -6,8 +6,9 @@
   </p:sldMasterIdLst>
   <p:sldIdLst>
     <p:sldId id="256" r:id="rId2"/>
-    <p:sldId id="258" r:id="rId3"/>
-    <p:sldId id="257" r:id="rId4"/>
+    <p:sldId id="259" r:id="rId3"/>
+    <p:sldId id="258" r:id="rId4"/>
+    <p:sldId id="257" r:id="rId5"/>
   </p:sldIdLst>
   <p:sldSz cx="12192000" cy="6858000"/>
   <p:notesSz cx="6858000" cy="9144000"/>
@@ -106,6 +107,11 @@
       </a:defRPr>
     </a:lvl9pPr>
   </p:defaultTextStyle>
+  <p:extLst>
+    <p:ext uri="{EFAFB233-063F-42B5-8137-9DF3F51BA10A}">
+      <p15:sldGuideLst xmlns:p15="http://schemas.microsoft.com/office/powerpoint/2012/main"/>
+    </p:ext>
+  </p:extLst>
 </p:presentation>
 </file>
 
@@ -256,7 +262,7 @@
           <a:p>
             <a:fld id="{A092AF85-09BF-459B-A408-9EB9361B3B08}" type="datetimeFigureOut">
               <a:rPr lang="en-US" smtClean="0"/>
-              <a:t>5/16/2018</a:t>
+              <a:t>7/30/2018</a:t>
             </a:fld>
             <a:endParaRPr lang="en-US"/>
           </a:p>
@@ -454,7 +460,7 @@
           <a:p>
             <a:fld id="{A092AF85-09BF-459B-A408-9EB9361B3B08}" type="datetimeFigureOut">
               <a:rPr lang="en-US" smtClean="0"/>
-              <a:t>5/16/2018</a:t>
+              <a:t>7/30/2018</a:t>
             </a:fld>
             <a:endParaRPr lang="en-US"/>
           </a:p>
@@ -662,7 +668,7 @@
           <a:p>
             <a:fld id="{A092AF85-09BF-459B-A408-9EB9361B3B08}" type="datetimeFigureOut">
               <a:rPr lang="en-US" smtClean="0"/>
-              <a:t>5/16/2018</a:t>
+              <a:t>7/30/2018</a:t>
             </a:fld>
             <a:endParaRPr lang="en-US"/>
           </a:p>
@@ -860,7 +866,7 @@
           <a:p>
             <a:fld id="{A092AF85-09BF-459B-A408-9EB9361B3B08}" type="datetimeFigureOut">
               <a:rPr lang="en-US" smtClean="0"/>
-              <a:t>5/16/2018</a:t>
+              <a:t>7/30/2018</a:t>
             </a:fld>
             <a:endParaRPr lang="en-US"/>
           </a:p>
@@ -1135,7 +1141,7 @@
           <a:p>
             <a:fld id="{A092AF85-09BF-459B-A408-9EB9361B3B08}" type="datetimeFigureOut">
               <a:rPr lang="en-US" smtClean="0"/>
-              <a:t>5/16/2018</a:t>
+              <a:t>7/30/2018</a:t>
             </a:fld>
             <a:endParaRPr lang="en-US"/>
           </a:p>
@@ -1400,7 +1406,7 @@
           <a:p>
             <a:fld id="{A092AF85-09BF-459B-A408-9EB9361B3B08}" type="datetimeFigureOut">
               <a:rPr lang="en-US" smtClean="0"/>
-              <a:t>5/16/2018</a:t>
+              <a:t>7/30/2018</a:t>
             </a:fld>
             <a:endParaRPr lang="en-US"/>
           </a:p>
@@ -1812,7 +1818,7 @@
           <a:p>
             <a:fld id="{A092AF85-09BF-459B-A408-9EB9361B3B08}" type="datetimeFigureOut">
               <a:rPr lang="en-US" smtClean="0"/>
-              <a:t>5/16/2018</a:t>
+              <a:t>7/30/2018</a:t>
             </a:fld>
             <a:endParaRPr lang="en-US"/>
           </a:p>
@@ -1953,7 +1959,7 @@
           <a:p>
             <a:fld id="{A092AF85-09BF-459B-A408-9EB9361B3B08}" type="datetimeFigureOut">
               <a:rPr lang="en-US" smtClean="0"/>
-              <a:t>5/16/2018</a:t>
+              <a:t>7/30/2018</a:t>
             </a:fld>
             <a:endParaRPr lang="en-US"/>
           </a:p>
@@ -2066,7 +2072,7 @@
           <a:p>
             <a:fld id="{A092AF85-09BF-459B-A408-9EB9361B3B08}" type="datetimeFigureOut">
               <a:rPr lang="en-US" smtClean="0"/>
-              <a:t>5/16/2018</a:t>
+              <a:t>7/30/2018</a:t>
             </a:fld>
             <a:endParaRPr lang="en-US"/>
           </a:p>
@@ -2377,7 +2383,7 @@
           <a:p>
             <a:fld id="{A092AF85-09BF-459B-A408-9EB9361B3B08}" type="datetimeFigureOut">
               <a:rPr lang="en-US" smtClean="0"/>
-              <a:t>5/16/2018</a:t>
+              <a:t>7/30/2018</a:t>
             </a:fld>
             <a:endParaRPr lang="en-US"/>
           </a:p>
@@ -2665,7 +2671,7 @@
           <a:p>
             <a:fld id="{A092AF85-09BF-459B-A408-9EB9361B3B08}" type="datetimeFigureOut">
               <a:rPr lang="en-US" smtClean="0"/>
-              <a:t>5/16/2018</a:t>
+              <a:t>7/30/2018</a:t>
             </a:fld>
             <a:endParaRPr lang="en-US"/>
           </a:p>
@@ -2906,7 +2912,7 @@
           <a:p>
             <a:fld id="{A092AF85-09BF-459B-A408-9EB9361B3B08}" type="datetimeFigureOut">
               <a:rPr lang="en-US" smtClean="0"/>
-              <a:t>5/16/2018</a:t>
+              <a:t>7/30/2018</a:t>
             </a:fld>
             <a:endParaRPr lang="en-US"/>
           </a:p>
@@ -3422,7 +3428,10 @@
               <a:rPr lang="en-US" dirty="0" err="1"/>
               <a:t>PhysicalModel</a:t>
             </a:r>
-            <a:endParaRPr lang="en-US" dirty="0"/>
+            <a:r>
+              <a:rPr lang="en-US" dirty="0"/>
+              <a:t> (“Site Model”)</a:t>
+            </a:r>
           </a:p>
         </p:txBody>
       </p:sp>
@@ -3440,7 +3449,7 @@
         </p:nvSpPr>
         <p:spPr>
           <a:xfrm>
-            <a:off x="601576" y="3657598"/>
+            <a:off x="288753" y="3670640"/>
             <a:ext cx="3336757" cy="1379621"/>
           </a:xfrm>
           <a:prstGeom prst="roundRect">
@@ -3475,7 +3484,10 @@
               <a:rPr lang="en-US" dirty="0" err="1"/>
               <a:t>PhysicalModel</a:t>
             </a:r>
-            <a:endParaRPr lang="en-US" dirty="0"/>
+            <a:r>
+              <a:rPr lang="en-US" dirty="0"/>
+              <a:t> (“Site Model”)</a:t>
+            </a:r>
           </a:p>
         </p:txBody>
       </p:sp>
@@ -3493,7 +3505,7 @@
         </p:nvSpPr>
         <p:spPr>
           <a:xfrm>
-            <a:off x="4375485" y="3670640"/>
+            <a:off x="4008522" y="3670640"/>
             <a:ext cx="3336757" cy="1392663"/>
           </a:xfrm>
           <a:prstGeom prst="roundRect">
@@ -3528,7 +3540,10 @@
               <a:rPr lang="en-US" dirty="0" err="1"/>
               <a:t>PhysicalModel</a:t>
             </a:r>
-            <a:endParaRPr lang="en-US" dirty="0"/>
+            <a:r>
+              <a:rPr lang="en-US" dirty="0"/>
+              <a:t> (“Bridge Model”)</a:t>
+            </a:r>
           </a:p>
         </p:txBody>
       </p:sp>
@@ -3546,8 +3561,8 @@
         </p:nvSpPr>
         <p:spPr>
           <a:xfrm>
-            <a:off x="8149394" y="3657598"/>
-            <a:ext cx="3336757" cy="1392663"/>
+            <a:off x="7728291" y="3670640"/>
+            <a:ext cx="4112610" cy="1392663"/>
           </a:xfrm>
           <a:prstGeom prst="roundRect">
             <a:avLst/>
@@ -3581,7 +3596,10 @@
               <a:rPr lang="en-US" dirty="0" err="1"/>
               <a:t>PhysicalModel</a:t>
             </a:r>
-            <a:endParaRPr lang="en-US" dirty="0"/>
+            <a:r>
+              <a:rPr lang="en-US" dirty="0"/>
+              <a:t> (“Sewer System Model”)</a:t>
+            </a:r>
           </a:p>
         </p:txBody>
       </p:sp>
@@ -3923,7 +3941,7 @@
         </p:nvSpPr>
         <p:spPr>
           <a:xfrm>
-            <a:off x="850224" y="4138863"/>
+            <a:off x="537401" y="4151905"/>
             <a:ext cx="625646" cy="300786"/>
           </a:xfrm>
           <a:prstGeom prst="roundRect">
@@ -3975,7 +3993,7 @@
         </p:nvSpPr>
         <p:spPr>
           <a:xfrm>
-            <a:off x="850224" y="4581521"/>
+            <a:off x="537401" y="4594563"/>
             <a:ext cx="994616" cy="300786"/>
           </a:xfrm>
           <a:prstGeom prst="roundRect">
@@ -4027,7 +4045,7 @@
         </p:nvSpPr>
         <p:spPr>
           <a:xfrm>
-            <a:off x="2093488" y="4581521"/>
+            <a:off x="1780665" y="4594563"/>
             <a:ext cx="1536033" cy="300786"/>
           </a:xfrm>
           <a:prstGeom prst="roundRect">
@@ -4082,7 +4100,7 @@
         </p:nvSpPr>
         <p:spPr>
           <a:xfrm>
-            <a:off x="2763249" y="4138863"/>
+            <a:off x="2450426" y="4151905"/>
             <a:ext cx="838204" cy="300786"/>
           </a:xfrm>
           <a:prstGeom prst="roundRect">
@@ -4136,7 +4154,7 @@
         </p:nvSpPr>
         <p:spPr>
           <a:xfrm>
-            <a:off x="4624139" y="4151905"/>
+            <a:off x="4257176" y="4151905"/>
             <a:ext cx="994616" cy="300786"/>
           </a:xfrm>
           <a:prstGeom prst="roundRect">
@@ -4188,7 +4206,7 @@
         </p:nvSpPr>
         <p:spPr>
           <a:xfrm>
-            <a:off x="5775163" y="4151905"/>
+            <a:off x="5408200" y="4151905"/>
             <a:ext cx="1864896" cy="300786"/>
           </a:xfrm>
           <a:prstGeom prst="roundRect">
@@ -4243,7 +4261,7 @@
         </p:nvSpPr>
         <p:spPr>
           <a:xfrm>
-            <a:off x="4624139" y="4606090"/>
+            <a:off x="4257176" y="4606090"/>
             <a:ext cx="838204" cy="300786"/>
           </a:xfrm>
           <a:prstGeom prst="roundRect">
@@ -4561,7 +4579,7 @@
         </p:nvSpPr>
         <p:spPr>
           <a:xfrm>
-            <a:off x="8313824" y="4127350"/>
+            <a:off x="7892721" y="4140392"/>
             <a:ext cx="994616" cy="300786"/>
           </a:xfrm>
           <a:prstGeom prst="roundRect">
@@ -4613,7 +4631,7 @@
         </p:nvSpPr>
         <p:spPr>
           <a:xfrm>
-            <a:off x="9464848" y="4127350"/>
+            <a:off x="9340522" y="4140392"/>
             <a:ext cx="1864896" cy="300786"/>
           </a:xfrm>
           <a:prstGeom prst="roundRect">
@@ -4668,7 +4686,7 @@
         </p:nvSpPr>
         <p:spPr>
           <a:xfrm>
-            <a:off x="8313824" y="4581535"/>
+            <a:off x="7970927" y="4594563"/>
             <a:ext cx="838204" cy="300786"/>
           </a:xfrm>
           <a:prstGeom prst="roundRect">
@@ -4722,7 +4740,7 @@
         </p:nvSpPr>
         <p:spPr>
           <a:xfrm>
-            <a:off x="9817772" y="4606090"/>
+            <a:off x="9599201" y="4606090"/>
             <a:ext cx="1347538" cy="300786"/>
           </a:xfrm>
           <a:prstGeom prst="roundRect">
@@ -4805,13 +4823,16 @@
               </a:ext>
             </a:extLst>
           </p:cNvPr>
-          <p:cNvCxnSpPr/>
+          <p:cNvCxnSpPr>
+            <a:cxnSpLocks/>
+            <a:endCxn id="6" idx="0"/>
+          </p:cNvCxnSpPr>
           <p:nvPr/>
         </p:nvCxnSpPr>
         <p:spPr>
           <a:xfrm flipH="1">
-            <a:off x="2269955" y="2923170"/>
-            <a:ext cx="1937086" cy="734428"/>
+            <a:off x="1957132" y="2923170"/>
+            <a:ext cx="2249910" cy="747470"/>
           </a:xfrm>
           <a:prstGeom prst="line">
             <a:avLst/>
@@ -4856,7 +4877,7 @@
         <p:spPr>
           <a:xfrm>
             <a:off x="5165556" y="2917149"/>
-            <a:ext cx="878308" cy="753491"/>
+            <a:ext cx="511345" cy="753491"/>
           </a:xfrm>
           <a:prstGeom prst="line">
             <a:avLst/>
@@ -4901,7 +4922,7 @@
         <p:spPr>
           <a:xfrm>
             <a:off x="7457570" y="2923170"/>
-            <a:ext cx="2360203" cy="734428"/>
+            <a:ext cx="2327026" cy="747470"/>
           </a:xfrm>
           <a:prstGeom prst="line">
             <a:avLst/>
@@ -5061,6 +5082,1846 @@
         </p:nvSpPr>
         <p:spPr>
           <a:xfrm>
+            <a:off x="4469661" y="270697"/>
+            <a:ext cx="3336757" cy="1532020"/>
+          </a:xfrm>
+          <a:prstGeom prst="roundRect">
+            <a:avLst/>
+          </a:prstGeom>
+        </p:spPr>
+        <p:style>
+          <a:lnRef idx="2">
+            <a:schemeClr val="accent1">
+              <a:shade val="50000"/>
+            </a:schemeClr>
+          </a:lnRef>
+          <a:fillRef idx="1">
+            <a:schemeClr val="accent1"/>
+          </a:fillRef>
+          <a:effectRef idx="0">
+            <a:schemeClr val="accent1"/>
+          </a:effectRef>
+          <a:fontRef idx="minor">
+            <a:schemeClr val="lt1"/>
+          </a:fontRef>
+        </p:style>
+        <p:txBody>
+          <a:bodyPr rtlCol="0" anchor="t"/>
+          <a:lstStyle/>
+          <a:p>
+            <a:pPr algn="ctr"/>
+            <a:r>
+              <a:rPr lang="en-US" dirty="0" err="1"/>
+              <a:t>RepositoryModel</a:t>
+            </a:r>
+            <a:endParaRPr lang="en-US" dirty="0"/>
+          </a:p>
+        </p:txBody>
+      </p:sp>
+      <p:sp>
+        <p:nvSpPr>
+          <p:cNvPr id="5" name="Rectangle: Rounded Corners 4">
+            <a:extLst>
+              <a:ext uri="{FF2B5EF4-FFF2-40B4-BE49-F238E27FC236}">
+                <a16:creationId xmlns:a16="http://schemas.microsoft.com/office/drawing/2014/main" id="{183ECF6F-4213-4EF0-A4C5-B4E030456FA7}"/>
+              </a:ext>
+            </a:extLst>
+          </p:cNvPr>
+          <p:cNvSpPr/>
+          <p:nvPr/>
+        </p:nvSpPr>
+        <p:spPr>
+          <a:xfrm>
+            <a:off x="3789947" y="3716257"/>
+            <a:ext cx="4612105" cy="905892"/>
+          </a:xfrm>
+          <a:prstGeom prst="roundRect">
+            <a:avLst/>
+          </a:prstGeom>
+          <a:solidFill>
+            <a:srgbClr val="00B0F0"/>
+          </a:solidFill>
+        </p:spPr>
+        <p:style>
+          <a:lnRef idx="2">
+            <a:schemeClr val="accent1">
+              <a:shade val="50000"/>
+            </a:schemeClr>
+          </a:lnRef>
+          <a:fillRef idx="1">
+            <a:schemeClr val="accent1"/>
+          </a:fillRef>
+          <a:effectRef idx="0">
+            <a:schemeClr val="accent1"/>
+          </a:effectRef>
+          <a:fontRef idx="minor">
+            <a:schemeClr val="lt1"/>
+          </a:fontRef>
+        </p:style>
+        <p:txBody>
+          <a:bodyPr rtlCol="0" anchor="t"/>
+          <a:lstStyle/>
+          <a:p>
+            <a:pPr algn="ctr"/>
+            <a:r>
+              <a:rPr lang="en-US" dirty="0" err="1"/>
+              <a:t>PhysicalModel</a:t>
+            </a:r>
+            <a:r>
+              <a:rPr lang="en-US" dirty="0"/>
+              <a:t> (“Site Model”)</a:t>
+            </a:r>
+          </a:p>
+        </p:txBody>
+      </p:sp>
+      <p:sp>
+        <p:nvSpPr>
+          <p:cNvPr id="6" name="Rectangle: Rounded Corners 5">
+            <a:extLst>
+              <a:ext uri="{FF2B5EF4-FFF2-40B4-BE49-F238E27FC236}">
+                <a16:creationId xmlns:a16="http://schemas.microsoft.com/office/drawing/2014/main" id="{8A64F2CF-F01C-4C22-971A-E3F6671DF428}"/>
+              </a:ext>
+            </a:extLst>
+          </p:cNvPr>
+          <p:cNvSpPr/>
+          <p:nvPr/>
+        </p:nvSpPr>
+        <p:spPr>
+          <a:xfrm>
+            <a:off x="340889" y="5194640"/>
+            <a:ext cx="3336757" cy="1379621"/>
+          </a:xfrm>
+          <a:prstGeom prst="roundRect">
+            <a:avLst/>
+          </a:prstGeom>
+          <a:solidFill>
+            <a:srgbClr val="00B0F0"/>
+          </a:solidFill>
+        </p:spPr>
+        <p:style>
+          <a:lnRef idx="2">
+            <a:schemeClr val="accent1">
+              <a:shade val="50000"/>
+            </a:schemeClr>
+          </a:lnRef>
+          <a:fillRef idx="1">
+            <a:schemeClr val="accent1"/>
+          </a:fillRef>
+          <a:effectRef idx="0">
+            <a:schemeClr val="accent1"/>
+          </a:effectRef>
+          <a:fontRef idx="minor">
+            <a:schemeClr val="lt1"/>
+          </a:fontRef>
+        </p:style>
+        <p:txBody>
+          <a:bodyPr rtlCol="0" anchor="t"/>
+          <a:lstStyle/>
+          <a:p>
+            <a:pPr algn="ctr"/>
+            <a:r>
+              <a:rPr lang="en-US" dirty="0" err="1"/>
+              <a:t>PhysicalModel</a:t>
+            </a:r>
+            <a:r>
+              <a:rPr lang="en-US" dirty="0"/>
+              <a:t> (“Site Model”)</a:t>
+            </a:r>
+          </a:p>
+        </p:txBody>
+      </p:sp>
+      <p:sp>
+        <p:nvSpPr>
+          <p:cNvPr id="7" name="Rectangle: Rounded Corners 6">
+            <a:extLst>
+              <a:ext uri="{FF2B5EF4-FFF2-40B4-BE49-F238E27FC236}">
+                <a16:creationId xmlns:a16="http://schemas.microsoft.com/office/drawing/2014/main" id="{6AB2F287-D5BD-4525-B8C5-BE253A2521C4}"/>
+              </a:ext>
+            </a:extLst>
+          </p:cNvPr>
+          <p:cNvSpPr/>
+          <p:nvPr/>
+        </p:nvSpPr>
+        <p:spPr>
+          <a:xfrm>
+            <a:off x="4060658" y="5194640"/>
+            <a:ext cx="3336757" cy="1392663"/>
+          </a:xfrm>
+          <a:prstGeom prst="roundRect">
+            <a:avLst/>
+          </a:prstGeom>
+          <a:solidFill>
+            <a:srgbClr val="00B0F0"/>
+          </a:solidFill>
+        </p:spPr>
+        <p:style>
+          <a:lnRef idx="2">
+            <a:schemeClr val="accent1">
+              <a:shade val="50000"/>
+            </a:schemeClr>
+          </a:lnRef>
+          <a:fillRef idx="1">
+            <a:schemeClr val="accent1"/>
+          </a:fillRef>
+          <a:effectRef idx="0">
+            <a:schemeClr val="accent1"/>
+          </a:effectRef>
+          <a:fontRef idx="minor">
+            <a:schemeClr val="lt1"/>
+          </a:fontRef>
+        </p:style>
+        <p:txBody>
+          <a:bodyPr rtlCol="0" anchor="t"/>
+          <a:lstStyle/>
+          <a:p>
+            <a:pPr algn="ctr"/>
+            <a:r>
+              <a:rPr lang="en-US" dirty="0" err="1"/>
+              <a:t>PhysicalModel</a:t>
+            </a:r>
+            <a:r>
+              <a:rPr lang="en-US" dirty="0"/>
+              <a:t> (“Bridge Model”)</a:t>
+            </a:r>
+          </a:p>
+        </p:txBody>
+      </p:sp>
+      <p:sp>
+        <p:nvSpPr>
+          <p:cNvPr id="8" name="Rectangle: Rounded Corners 7">
+            <a:extLst>
+              <a:ext uri="{FF2B5EF4-FFF2-40B4-BE49-F238E27FC236}">
+                <a16:creationId xmlns:a16="http://schemas.microsoft.com/office/drawing/2014/main" id="{00EA0955-FF95-4B82-82D0-2053246044BF}"/>
+              </a:ext>
+            </a:extLst>
+          </p:cNvPr>
+          <p:cNvSpPr/>
+          <p:nvPr/>
+        </p:nvSpPr>
+        <p:spPr>
+          <a:xfrm>
+            <a:off x="7780427" y="5194640"/>
+            <a:ext cx="4112610" cy="1392663"/>
+          </a:xfrm>
+          <a:prstGeom prst="roundRect">
+            <a:avLst/>
+          </a:prstGeom>
+          <a:solidFill>
+            <a:srgbClr val="00B0F0"/>
+          </a:solidFill>
+        </p:spPr>
+        <p:style>
+          <a:lnRef idx="2">
+            <a:schemeClr val="accent1">
+              <a:shade val="50000"/>
+            </a:schemeClr>
+          </a:lnRef>
+          <a:fillRef idx="1">
+            <a:schemeClr val="accent1"/>
+          </a:fillRef>
+          <a:effectRef idx="0">
+            <a:schemeClr val="accent1"/>
+          </a:effectRef>
+          <a:fontRef idx="minor">
+            <a:schemeClr val="lt1"/>
+          </a:fontRef>
+        </p:style>
+        <p:txBody>
+          <a:bodyPr rtlCol="0" anchor="t"/>
+          <a:lstStyle/>
+          <a:p>
+            <a:pPr algn="ctr"/>
+            <a:r>
+              <a:rPr lang="en-US" dirty="0" err="1"/>
+              <a:t>PhysicalModel</a:t>
+            </a:r>
+            <a:r>
+              <a:rPr lang="en-US" dirty="0"/>
+              <a:t> (“Sewer System Model”)</a:t>
+            </a:r>
+          </a:p>
+        </p:txBody>
+      </p:sp>
+      <p:sp>
+        <p:nvSpPr>
+          <p:cNvPr id="9" name="Rectangle: Rounded Corners 8">
+            <a:extLst>
+              <a:ext uri="{FF2B5EF4-FFF2-40B4-BE49-F238E27FC236}">
+                <a16:creationId xmlns:a16="http://schemas.microsoft.com/office/drawing/2014/main" id="{DA315657-0B81-45B9-A160-7E17A1A55A40}"/>
+              </a:ext>
+            </a:extLst>
+          </p:cNvPr>
+          <p:cNvSpPr/>
+          <p:nvPr/>
+        </p:nvSpPr>
+        <p:spPr>
+          <a:xfrm>
+            <a:off x="5576565" y="744000"/>
+            <a:ext cx="1122948" cy="325860"/>
+          </a:xfrm>
+          <a:prstGeom prst="roundRect">
+            <a:avLst/>
+          </a:prstGeom>
+          <a:solidFill>
+            <a:schemeClr val="tx1">
+              <a:lumMod val="75000"/>
+              <a:lumOff val="25000"/>
+            </a:schemeClr>
+          </a:solidFill>
+        </p:spPr>
+        <p:style>
+          <a:lnRef idx="2">
+            <a:schemeClr val="accent1">
+              <a:shade val="50000"/>
+            </a:schemeClr>
+          </a:lnRef>
+          <a:fillRef idx="1">
+            <a:schemeClr val="accent1"/>
+          </a:fillRef>
+          <a:effectRef idx="0">
+            <a:schemeClr val="accent1"/>
+          </a:effectRef>
+          <a:fontRef idx="minor">
+            <a:schemeClr val="lt1"/>
+          </a:fontRef>
+        </p:style>
+        <p:txBody>
+          <a:bodyPr rtlCol="0" anchor="ctr"/>
+          <a:lstStyle/>
+          <a:p>
+            <a:pPr algn="ctr"/>
+            <a:r>
+              <a:rPr lang="en-US" dirty="0"/>
+              <a:t>Subject</a:t>
+            </a:r>
+          </a:p>
+        </p:txBody>
+      </p:sp>
+      <p:sp>
+        <p:nvSpPr>
+          <p:cNvPr id="10" name="Rectangle: Rounded Corners 9">
+            <a:extLst>
+              <a:ext uri="{FF2B5EF4-FFF2-40B4-BE49-F238E27FC236}">
+                <a16:creationId xmlns:a16="http://schemas.microsoft.com/office/drawing/2014/main" id="{FDDF243F-BE4E-4D69-9AE7-5BB4615296B1}"/>
+              </a:ext>
+            </a:extLst>
+          </p:cNvPr>
+          <p:cNvSpPr/>
+          <p:nvPr/>
+        </p:nvSpPr>
+        <p:spPr>
+          <a:xfrm>
+            <a:off x="5243691" y="1304463"/>
+            <a:ext cx="1788696" cy="339880"/>
+          </a:xfrm>
+          <a:prstGeom prst="roundRect">
+            <a:avLst/>
+          </a:prstGeom>
+          <a:solidFill>
+            <a:schemeClr val="tx1">
+              <a:lumMod val="75000"/>
+              <a:lumOff val="25000"/>
+            </a:schemeClr>
+          </a:solidFill>
+        </p:spPr>
+        <p:style>
+          <a:lnRef idx="2">
+            <a:schemeClr val="accent1">
+              <a:shade val="50000"/>
+            </a:schemeClr>
+          </a:lnRef>
+          <a:fillRef idx="1">
+            <a:schemeClr val="accent1"/>
+          </a:fillRef>
+          <a:effectRef idx="0">
+            <a:schemeClr val="accent1"/>
+          </a:effectRef>
+          <a:fontRef idx="minor">
+            <a:schemeClr val="lt1"/>
+          </a:fontRef>
+        </p:style>
+        <p:txBody>
+          <a:bodyPr rtlCol="0" anchor="ctr"/>
+          <a:lstStyle/>
+          <a:p>
+            <a:pPr algn="ctr"/>
+            <a:r>
+              <a:rPr lang="en-US" dirty="0" err="1"/>
+              <a:t>PhysicalPartition</a:t>
+            </a:r>
+            <a:endParaRPr lang="en-US" dirty="0"/>
+          </a:p>
+        </p:txBody>
+      </p:sp>
+      <p:sp>
+        <p:nvSpPr>
+          <p:cNvPr id="11" name="Rectangle: Rounded Corners 10">
+            <a:extLst>
+              <a:ext uri="{FF2B5EF4-FFF2-40B4-BE49-F238E27FC236}">
+                <a16:creationId xmlns:a16="http://schemas.microsoft.com/office/drawing/2014/main" id="{7BD3880D-E2B3-4CA0-87E2-14FC3D73EC9F}"/>
+              </a:ext>
+            </a:extLst>
+          </p:cNvPr>
+          <p:cNvSpPr/>
+          <p:nvPr/>
+        </p:nvSpPr>
+        <p:spPr>
+          <a:xfrm>
+            <a:off x="3946354" y="4146384"/>
+            <a:ext cx="625646" cy="300786"/>
+          </a:xfrm>
+          <a:prstGeom prst="roundRect">
+            <a:avLst/>
+          </a:prstGeom>
+          <a:solidFill>
+            <a:srgbClr val="7030A0"/>
+          </a:solidFill>
+        </p:spPr>
+        <p:style>
+          <a:lnRef idx="2">
+            <a:schemeClr val="accent1">
+              <a:shade val="50000"/>
+            </a:schemeClr>
+          </a:lnRef>
+          <a:fillRef idx="1">
+            <a:schemeClr val="accent1"/>
+          </a:fillRef>
+          <a:effectRef idx="0">
+            <a:schemeClr val="accent1"/>
+          </a:effectRef>
+          <a:fontRef idx="minor">
+            <a:schemeClr val="lt1"/>
+          </a:fontRef>
+        </p:style>
+        <p:txBody>
+          <a:bodyPr rtlCol="0" anchor="ctr"/>
+          <a:lstStyle/>
+          <a:p>
+            <a:pPr algn="ctr"/>
+            <a:r>
+              <a:rPr lang="en-US" dirty="0"/>
+              <a:t>Site</a:t>
+            </a:r>
+          </a:p>
+        </p:txBody>
+      </p:sp>
+      <p:sp>
+        <p:nvSpPr>
+          <p:cNvPr id="12" name="Rectangle: Rounded Corners 11">
+            <a:extLst>
+              <a:ext uri="{FF2B5EF4-FFF2-40B4-BE49-F238E27FC236}">
+                <a16:creationId xmlns:a16="http://schemas.microsoft.com/office/drawing/2014/main" id="{1A5CAB5A-E704-4019-9C37-8AC6AC4B7AA7}"/>
+              </a:ext>
+            </a:extLst>
+          </p:cNvPr>
+          <p:cNvSpPr/>
+          <p:nvPr/>
+        </p:nvSpPr>
+        <p:spPr>
+          <a:xfrm>
+            <a:off x="4720384" y="4140363"/>
+            <a:ext cx="994616" cy="300786"/>
+          </a:xfrm>
+          <a:prstGeom prst="roundRect">
+            <a:avLst/>
+          </a:prstGeom>
+          <a:solidFill>
+            <a:srgbClr val="00B050"/>
+          </a:solidFill>
+        </p:spPr>
+        <p:style>
+          <a:lnRef idx="2">
+            <a:schemeClr val="accent1">
+              <a:shade val="50000"/>
+            </a:schemeClr>
+          </a:lnRef>
+          <a:fillRef idx="1">
+            <a:schemeClr val="accent1"/>
+          </a:fillRef>
+          <a:effectRef idx="0">
+            <a:schemeClr val="accent1"/>
+          </a:effectRef>
+          <a:fontRef idx="minor">
+            <a:schemeClr val="lt1"/>
+          </a:fontRef>
+        </p:style>
+        <p:txBody>
+          <a:bodyPr rtlCol="0" anchor="ctr"/>
+          <a:lstStyle/>
+          <a:p>
+            <a:pPr algn="ctr"/>
+            <a:r>
+              <a:rPr lang="en-US" dirty="0"/>
+              <a:t>Bridge</a:t>
+            </a:r>
+          </a:p>
+        </p:txBody>
+      </p:sp>
+      <p:sp>
+        <p:nvSpPr>
+          <p:cNvPr id="13" name="Rectangle: Rounded Corners 12">
+            <a:extLst>
+              <a:ext uri="{FF2B5EF4-FFF2-40B4-BE49-F238E27FC236}">
+                <a16:creationId xmlns:a16="http://schemas.microsoft.com/office/drawing/2014/main" id="{43BEFFE2-5392-4BA6-9639-B945B9832EE5}"/>
+              </a:ext>
+            </a:extLst>
+          </p:cNvPr>
+          <p:cNvSpPr/>
+          <p:nvPr/>
+        </p:nvSpPr>
+        <p:spPr>
+          <a:xfrm>
+            <a:off x="6741689" y="4146384"/>
+            <a:ext cx="1536033" cy="300786"/>
+          </a:xfrm>
+          <a:prstGeom prst="roundRect">
+            <a:avLst/>
+          </a:prstGeom>
+          <a:solidFill>
+            <a:schemeClr val="accent2">
+              <a:lumMod val="50000"/>
+            </a:schemeClr>
+          </a:solidFill>
+        </p:spPr>
+        <p:style>
+          <a:lnRef idx="2">
+            <a:schemeClr val="accent1">
+              <a:shade val="50000"/>
+            </a:schemeClr>
+          </a:lnRef>
+          <a:fillRef idx="1">
+            <a:schemeClr val="accent1"/>
+          </a:fillRef>
+          <a:effectRef idx="0">
+            <a:schemeClr val="accent1"/>
+          </a:effectRef>
+          <a:fontRef idx="minor">
+            <a:schemeClr val="lt1"/>
+          </a:fontRef>
+        </p:style>
+        <p:txBody>
+          <a:bodyPr rtlCol="0" anchor="ctr"/>
+          <a:lstStyle/>
+          <a:p>
+            <a:pPr algn="ctr"/>
+            <a:r>
+              <a:rPr lang="en-US" dirty="0" err="1"/>
+              <a:t>SewerSystem</a:t>
+            </a:r>
+            <a:endParaRPr lang="en-US" dirty="0"/>
+          </a:p>
+        </p:txBody>
+      </p:sp>
+      <p:sp>
+        <p:nvSpPr>
+          <p:cNvPr id="14" name="Rectangle: Rounded Corners 13">
+            <a:extLst>
+              <a:ext uri="{FF2B5EF4-FFF2-40B4-BE49-F238E27FC236}">
+                <a16:creationId xmlns:a16="http://schemas.microsoft.com/office/drawing/2014/main" id="{732186FD-499B-4E9D-9F3D-B0A468820BED}"/>
+              </a:ext>
+            </a:extLst>
+          </p:cNvPr>
+          <p:cNvSpPr/>
+          <p:nvPr/>
+        </p:nvSpPr>
+        <p:spPr>
+          <a:xfrm>
+            <a:off x="5879427" y="4146384"/>
+            <a:ext cx="713878" cy="300786"/>
+          </a:xfrm>
+          <a:prstGeom prst="roundRect">
+            <a:avLst/>
+          </a:prstGeom>
+          <a:solidFill>
+            <a:schemeClr val="bg1">
+              <a:lumMod val="50000"/>
+            </a:schemeClr>
+          </a:solidFill>
+        </p:spPr>
+        <p:style>
+          <a:lnRef idx="2">
+            <a:schemeClr val="accent1">
+              <a:shade val="50000"/>
+            </a:schemeClr>
+          </a:lnRef>
+          <a:fillRef idx="1">
+            <a:schemeClr val="accent1"/>
+          </a:fillRef>
+          <a:effectRef idx="0">
+            <a:schemeClr val="accent1"/>
+          </a:effectRef>
+          <a:fontRef idx="minor">
+            <a:schemeClr val="lt1"/>
+          </a:fontRef>
+        </p:style>
+        <p:txBody>
+          <a:bodyPr rtlCol="0" anchor="ctr"/>
+          <a:lstStyle/>
+          <a:p>
+            <a:pPr algn="ctr"/>
+            <a:r>
+              <a:rPr lang="en-US" dirty="0"/>
+              <a:t>Chair</a:t>
+            </a:r>
+          </a:p>
+        </p:txBody>
+      </p:sp>
+      <p:sp>
+        <p:nvSpPr>
+          <p:cNvPr id="16" name="Rectangle: Rounded Corners 15">
+            <a:extLst>
+              <a:ext uri="{FF2B5EF4-FFF2-40B4-BE49-F238E27FC236}">
+                <a16:creationId xmlns:a16="http://schemas.microsoft.com/office/drawing/2014/main" id="{6EDAF18D-E557-4229-B283-45B5B049FB98}"/>
+              </a:ext>
+            </a:extLst>
+          </p:cNvPr>
+          <p:cNvSpPr/>
+          <p:nvPr/>
+        </p:nvSpPr>
+        <p:spPr>
+          <a:xfrm>
+            <a:off x="589537" y="6118563"/>
+            <a:ext cx="994616" cy="300786"/>
+          </a:xfrm>
+          <a:prstGeom prst="roundRect">
+            <a:avLst/>
+          </a:prstGeom>
+          <a:solidFill>
+            <a:srgbClr val="00B050"/>
+          </a:solidFill>
+        </p:spPr>
+        <p:style>
+          <a:lnRef idx="2">
+            <a:schemeClr val="accent1">
+              <a:shade val="50000"/>
+            </a:schemeClr>
+          </a:lnRef>
+          <a:fillRef idx="1">
+            <a:schemeClr val="accent1"/>
+          </a:fillRef>
+          <a:effectRef idx="0">
+            <a:schemeClr val="accent1"/>
+          </a:effectRef>
+          <a:fontRef idx="minor">
+            <a:schemeClr val="lt1"/>
+          </a:fontRef>
+        </p:style>
+        <p:txBody>
+          <a:bodyPr rtlCol="0" anchor="ctr"/>
+          <a:lstStyle/>
+          <a:p>
+            <a:pPr algn="ctr"/>
+            <a:r>
+              <a:rPr lang="en-US" dirty="0"/>
+              <a:t>Tunnel</a:t>
+            </a:r>
+          </a:p>
+        </p:txBody>
+      </p:sp>
+      <p:sp>
+        <p:nvSpPr>
+          <p:cNvPr id="17" name="Rectangle: Rounded Corners 16">
+            <a:extLst>
+              <a:ext uri="{FF2B5EF4-FFF2-40B4-BE49-F238E27FC236}">
+                <a16:creationId xmlns:a16="http://schemas.microsoft.com/office/drawing/2014/main" id="{A34A3CF6-9850-4E55-A41B-47EA31C0AA9E}"/>
+              </a:ext>
+            </a:extLst>
+          </p:cNvPr>
+          <p:cNvSpPr/>
+          <p:nvPr/>
+        </p:nvSpPr>
+        <p:spPr>
+          <a:xfrm>
+            <a:off x="1832801" y="6118563"/>
+            <a:ext cx="1536033" cy="300786"/>
+          </a:xfrm>
+          <a:prstGeom prst="roundRect">
+            <a:avLst/>
+          </a:prstGeom>
+          <a:solidFill>
+            <a:schemeClr val="accent2">
+              <a:lumMod val="50000"/>
+            </a:schemeClr>
+          </a:solidFill>
+        </p:spPr>
+        <p:style>
+          <a:lnRef idx="2">
+            <a:schemeClr val="accent1">
+              <a:shade val="50000"/>
+            </a:schemeClr>
+          </a:lnRef>
+          <a:fillRef idx="1">
+            <a:schemeClr val="accent1"/>
+          </a:fillRef>
+          <a:effectRef idx="0">
+            <a:schemeClr val="accent1"/>
+          </a:effectRef>
+          <a:fontRef idx="minor">
+            <a:schemeClr val="lt1"/>
+          </a:fontRef>
+        </p:style>
+        <p:txBody>
+          <a:bodyPr rtlCol="0" anchor="ctr"/>
+          <a:lstStyle/>
+          <a:p>
+            <a:pPr algn="ctr"/>
+            <a:r>
+              <a:rPr lang="en-US" dirty="0" err="1"/>
+              <a:t>SewerSystem</a:t>
+            </a:r>
+            <a:endParaRPr lang="en-US" dirty="0"/>
+          </a:p>
+        </p:txBody>
+      </p:sp>
+      <p:sp>
+        <p:nvSpPr>
+          <p:cNvPr id="18" name="Rectangle: Rounded Corners 17">
+            <a:extLst>
+              <a:ext uri="{FF2B5EF4-FFF2-40B4-BE49-F238E27FC236}">
+                <a16:creationId xmlns:a16="http://schemas.microsoft.com/office/drawing/2014/main" id="{DC7234F4-E553-478D-9CC6-FB8FFF59E5A8}"/>
+              </a:ext>
+            </a:extLst>
+          </p:cNvPr>
+          <p:cNvSpPr/>
+          <p:nvPr/>
+        </p:nvSpPr>
+        <p:spPr>
+          <a:xfrm>
+            <a:off x="2502562" y="5675905"/>
+            <a:ext cx="838204" cy="300786"/>
+          </a:xfrm>
+          <a:prstGeom prst="roundRect">
+            <a:avLst/>
+          </a:prstGeom>
+          <a:solidFill>
+            <a:schemeClr val="bg1">
+              <a:lumMod val="50000"/>
+            </a:schemeClr>
+          </a:solidFill>
+        </p:spPr>
+        <p:style>
+          <a:lnRef idx="2">
+            <a:schemeClr val="accent1">
+              <a:shade val="50000"/>
+            </a:schemeClr>
+          </a:lnRef>
+          <a:fillRef idx="1">
+            <a:schemeClr val="accent1"/>
+          </a:fillRef>
+          <a:effectRef idx="0">
+            <a:schemeClr val="accent1"/>
+          </a:effectRef>
+          <a:fontRef idx="minor">
+            <a:schemeClr val="lt1"/>
+          </a:fontRef>
+        </p:style>
+        <p:txBody>
+          <a:bodyPr rtlCol="0" anchor="ctr"/>
+          <a:lstStyle/>
+          <a:p>
+            <a:pPr algn="ctr"/>
+            <a:r>
+              <a:rPr lang="en-US" dirty="0"/>
+              <a:t>Bench</a:t>
+            </a:r>
+          </a:p>
+        </p:txBody>
+      </p:sp>
+      <p:sp>
+        <p:nvSpPr>
+          <p:cNvPr id="19" name="Rectangle: Rounded Corners 18">
+            <a:extLst>
+              <a:ext uri="{FF2B5EF4-FFF2-40B4-BE49-F238E27FC236}">
+                <a16:creationId xmlns:a16="http://schemas.microsoft.com/office/drawing/2014/main" id="{F544445C-D606-463B-A360-7345044BACD2}"/>
+              </a:ext>
+            </a:extLst>
+          </p:cNvPr>
+          <p:cNvSpPr/>
+          <p:nvPr/>
+        </p:nvSpPr>
+        <p:spPr>
+          <a:xfrm>
+            <a:off x="4309312" y="5675905"/>
+            <a:ext cx="994616" cy="300786"/>
+          </a:xfrm>
+          <a:prstGeom prst="roundRect">
+            <a:avLst/>
+          </a:prstGeom>
+          <a:solidFill>
+            <a:srgbClr val="00B050"/>
+          </a:solidFill>
+        </p:spPr>
+        <p:style>
+          <a:lnRef idx="2">
+            <a:schemeClr val="accent1">
+              <a:shade val="50000"/>
+            </a:schemeClr>
+          </a:lnRef>
+          <a:fillRef idx="1">
+            <a:schemeClr val="accent1"/>
+          </a:fillRef>
+          <a:effectRef idx="0">
+            <a:schemeClr val="accent1"/>
+          </a:effectRef>
+          <a:fontRef idx="minor">
+            <a:schemeClr val="lt1"/>
+          </a:fontRef>
+        </p:style>
+        <p:txBody>
+          <a:bodyPr rtlCol="0" anchor="ctr"/>
+          <a:lstStyle/>
+          <a:p>
+            <a:pPr algn="ctr"/>
+            <a:r>
+              <a:rPr lang="en-US" dirty="0"/>
+              <a:t>Building</a:t>
+            </a:r>
+          </a:p>
+        </p:txBody>
+      </p:sp>
+      <p:sp>
+        <p:nvSpPr>
+          <p:cNvPr id="20" name="Rectangle: Rounded Corners 19">
+            <a:extLst>
+              <a:ext uri="{FF2B5EF4-FFF2-40B4-BE49-F238E27FC236}">
+                <a16:creationId xmlns:a16="http://schemas.microsoft.com/office/drawing/2014/main" id="{B5B9EEC8-8FB0-4504-B3B8-642A0E7BE910}"/>
+              </a:ext>
+            </a:extLst>
+          </p:cNvPr>
+          <p:cNvSpPr/>
+          <p:nvPr/>
+        </p:nvSpPr>
+        <p:spPr>
+          <a:xfrm>
+            <a:off x="5460336" y="5675905"/>
+            <a:ext cx="1864896" cy="300786"/>
+          </a:xfrm>
+          <a:prstGeom prst="roundRect">
+            <a:avLst/>
+          </a:prstGeom>
+          <a:solidFill>
+            <a:schemeClr val="accent2">
+              <a:lumMod val="50000"/>
+            </a:schemeClr>
+          </a:solidFill>
+        </p:spPr>
+        <p:style>
+          <a:lnRef idx="2">
+            <a:schemeClr val="accent1">
+              <a:shade val="50000"/>
+            </a:schemeClr>
+          </a:lnRef>
+          <a:fillRef idx="1">
+            <a:schemeClr val="accent1"/>
+          </a:fillRef>
+          <a:effectRef idx="0">
+            <a:schemeClr val="accent1"/>
+          </a:effectRef>
+          <a:fontRef idx="minor">
+            <a:schemeClr val="lt1"/>
+          </a:fontRef>
+        </p:style>
+        <p:txBody>
+          <a:bodyPr rtlCol="0" anchor="ctr"/>
+          <a:lstStyle/>
+          <a:p>
+            <a:pPr algn="ctr"/>
+            <a:r>
+              <a:rPr lang="en-US" dirty="0" err="1"/>
+              <a:t>StructuralSystem</a:t>
+            </a:r>
+            <a:endParaRPr lang="en-US" dirty="0"/>
+          </a:p>
+        </p:txBody>
+      </p:sp>
+      <p:sp>
+        <p:nvSpPr>
+          <p:cNvPr id="21" name="Rectangle: Rounded Corners 20">
+            <a:extLst>
+              <a:ext uri="{FF2B5EF4-FFF2-40B4-BE49-F238E27FC236}">
+                <a16:creationId xmlns:a16="http://schemas.microsoft.com/office/drawing/2014/main" id="{87BF05CC-757A-44C2-BC17-59F19C3029A0}"/>
+              </a:ext>
+            </a:extLst>
+          </p:cNvPr>
+          <p:cNvSpPr/>
+          <p:nvPr/>
+        </p:nvSpPr>
+        <p:spPr>
+          <a:xfrm>
+            <a:off x="4309312" y="6130090"/>
+            <a:ext cx="838204" cy="300786"/>
+          </a:xfrm>
+          <a:prstGeom prst="roundRect">
+            <a:avLst/>
+          </a:prstGeom>
+          <a:solidFill>
+            <a:schemeClr val="bg1">
+              <a:lumMod val="50000"/>
+            </a:schemeClr>
+          </a:solidFill>
+        </p:spPr>
+        <p:style>
+          <a:lnRef idx="2">
+            <a:schemeClr val="accent1">
+              <a:shade val="50000"/>
+            </a:schemeClr>
+          </a:lnRef>
+          <a:fillRef idx="1">
+            <a:schemeClr val="accent1"/>
+          </a:fillRef>
+          <a:effectRef idx="0">
+            <a:schemeClr val="accent1"/>
+          </a:effectRef>
+          <a:fontRef idx="minor">
+            <a:schemeClr val="lt1"/>
+          </a:fontRef>
+        </p:style>
+        <p:txBody>
+          <a:bodyPr rtlCol="0" anchor="ctr"/>
+          <a:lstStyle/>
+          <a:p>
+            <a:pPr algn="ctr"/>
+            <a:r>
+              <a:rPr lang="en-US" dirty="0"/>
+              <a:t>Bolt</a:t>
+            </a:r>
+          </a:p>
+        </p:txBody>
+      </p:sp>
+      <p:sp>
+        <p:nvSpPr>
+          <p:cNvPr id="22" name="Rectangle: Rounded Corners 21">
+            <a:extLst>
+              <a:ext uri="{FF2B5EF4-FFF2-40B4-BE49-F238E27FC236}">
+                <a16:creationId xmlns:a16="http://schemas.microsoft.com/office/drawing/2014/main" id="{6D50367A-E314-4993-BF39-2407AB5263A4}"/>
+              </a:ext>
+            </a:extLst>
+          </p:cNvPr>
+          <p:cNvSpPr/>
+          <p:nvPr/>
+        </p:nvSpPr>
+        <p:spPr>
+          <a:xfrm>
+            <a:off x="9918036" y="1554265"/>
+            <a:ext cx="625646" cy="300786"/>
+          </a:xfrm>
+          <a:prstGeom prst="roundRect">
+            <a:avLst/>
+          </a:prstGeom>
+          <a:solidFill>
+            <a:srgbClr val="7030A0"/>
+          </a:solidFill>
+        </p:spPr>
+        <p:style>
+          <a:lnRef idx="2">
+            <a:schemeClr val="accent1">
+              <a:shade val="50000"/>
+            </a:schemeClr>
+          </a:lnRef>
+          <a:fillRef idx="1">
+            <a:schemeClr val="accent1"/>
+          </a:fillRef>
+          <a:effectRef idx="0">
+            <a:schemeClr val="accent1"/>
+          </a:effectRef>
+          <a:fontRef idx="minor">
+            <a:schemeClr val="lt1"/>
+          </a:fontRef>
+        </p:style>
+        <p:txBody>
+          <a:bodyPr rtlCol="0" anchor="ctr"/>
+          <a:lstStyle/>
+          <a:p>
+            <a:pPr algn="ctr"/>
+            <a:r>
+              <a:rPr lang="en-US" dirty="0"/>
+              <a:t>Site</a:t>
+            </a:r>
+          </a:p>
+        </p:txBody>
+      </p:sp>
+      <p:sp>
+        <p:nvSpPr>
+          <p:cNvPr id="23" name="Rectangle: Rounded Corners 22">
+            <a:extLst>
+              <a:ext uri="{FF2B5EF4-FFF2-40B4-BE49-F238E27FC236}">
+                <a16:creationId xmlns:a16="http://schemas.microsoft.com/office/drawing/2014/main" id="{B052D830-409D-4D1D-B6ED-448A7574456E}"/>
+              </a:ext>
+            </a:extLst>
+          </p:cNvPr>
+          <p:cNvSpPr/>
+          <p:nvPr/>
+        </p:nvSpPr>
+        <p:spPr>
+          <a:xfrm>
+            <a:off x="9733551" y="2030518"/>
+            <a:ext cx="994616" cy="300786"/>
+          </a:xfrm>
+          <a:prstGeom prst="roundRect">
+            <a:avLst/>
+          </a:prstGeom>
+          <a:solidFill>
+            <a:srgbClr val="00B050"/>
+          </a:solidFill>
+        </p:spPr>
+        <p:style>
+          <a:lnRef idx="2">
+            <a:schemeClr val="accent1">
+              <a:shade val="50000"/>
+            </a:schemeClr>
+          </a:lnRef>
+          <a:fillRef idx="1">
+            <a:schemeClr val="accent1"/>
+          </a:fillRef>
+          <a:effectRef idx="0">
+            <a:schemeClr val="accent1"/>
+          </a:effectRef>
+          <a:fontRef idx="minor">
+            <a:schemeClr val="lt1"/>
+          </a:fontRef>
+        </p:style>
+        <p:txBody>
+          <a:bodyPr rtlCol="0" anchor="ctr"/>
+          <a:lstStyle/>
+          <a:p>
+            <a:pPr algn="ctr"/>
+            <a:r>
+              <a:rPr lang="en-US" dirty="0"/>
+              <a:t>Facility</a:t>
+            </a:r>
+          </a:p>
+        </p:txBody>
+      </p:sp>
+      <p:sp>
+        <p:nvSpPr>
+          <p:cNvPr id="24" name="Rectangle: Rounded Corners 23">
+            <a:extLst>
+              <a:ext uri="{FF2B5EF4-FFF2-40B4-BE49-F238E27FC236}">
+                <a16:creationId xmlns:a16="http://schemas.microsoft.com/office/drawing/2014/main" id="{432424BB-5EBE-4876-BEEE-84E98AF4D795}"/>
+              </a:ext>
+            </a:extLst>
+          </p:cNvPr>
+          <p:cNvSpPr/>
+          <p:nvPr/>
+        </p:nvSpPr>
+        <p:spPr>
+          <a:xfrm>
+            <a:off x="9733551" y="2506771"/>
+            <a:ext cx="994616" cy="300786"/>
+          </a:xfrm>
+          <a:prstGeom prst="roundRect">
+            <a:avLst/>
+          </a:prstGeom>
+          <a:solidFill>
+            <a:schemeClr val="accent2">
+              <a:lumMod val="50000"/>
+            </a:schemeClr>
+          </a:solidFill>
+        </p:spPr>
+        <p:style>
+          <a:lnRef idx="2">
+            <a:schemeClr val="accent1">
+              <a:shade val="50000"/>
+            </a:schemeClr>
+          </a:lnRef>
+          <a:fillRef idx="1">
+            <a:schemeClr val="accent1"/>
+          </a:fillRef>
+          <a:effectRef idx="0">
+            <a:schemeClr val="accent1"/>
+          </a:effectRef>
+          <a:fontRef idx="minor">
+            <a:schemeClr val="lt1"/>
+          </a:fontRef>
+        </p:style>
+        <p:txBody>
+          <a:bodyPr rtlCol="0" anchor="ctr"/>
+          <a:lstStyle/>
+          <a:p>
+            <a:pPr algn="ctr"/>
+            <a:r>
+              <a:rPr lang="en-US" dirty="0"/>
+              <a:t>System</a:t>
+            </a:r>
+          </a:p>
+        </p:txBody>
+      </p:sp>
+      <p:sp>
+        <p:nvSpPr>
+          <p:cNvPr id="25" name="Rectangle: Rounded Corners 24">
+            <a:extLst>
+              <a:ext uri="{FF2B5EF4-FFF2-40B4-BE49-F238E27FC236}">
+                <a16:creationId xmlns:a16="http://schemas.microsoft.com/office/drawing/2014/main" id="{4E5FAB24-9457-45F3-81D9-E9DEAEE3B8BD}"/>
+              </a:ext>
+            </a:extLst>
+          </p:cNvPr>
+          <p:cNvSpPr/>
+          <p:nvPr/>
+        </p:nvSpPr>
+        <p:spPr>
+          <a:xfrm>
+            <a:off x="9204164" y="2983024"/>
+            <a:ext cx="2053390" cy="300786"/>
+          </a:xfrm>
+          <a:prstGeom prst="roundRect">
+            <a:avLst/>
+          </a:prstGeom>
+          <a:solidFill>
+            <a:srgbClr val="C00000"/>
+          </a:solidFill>
+        </p:spPr>
+        <p:style>
+          <a:lnRef idx="2">
+            <a:schemeClr val="accent1">
+              <a:shade val="50000"/>
+            </a:schemeClr>
+          </a:lnRef>
+          <a:fillRef idx="1">
+            <a:schemeClr val="accent1"/>
+          </a:fillRef>
+          <a:effectRef idx="0">
+            <a:schemeClr val="accent1"/>
+          </a:effectRef>
+          <a:fontRef idx="minor">
+            <a:schemeClr val="lt1"/>
+          </a:fontRef>
+        </p:style>
+        <p:txBody>
+          <a:bodyPr rtlCol="0" anchor="ctr"/>
+          <a:lstStyle/>
+          <a:p>
+            <a:pPr algn="ctr"/>
+            <a:r>
+              <a:rPr lang="en-US" dirty="0"/>
+              <a:t>System Component</a:t>
+            </a:r>
+          </a:p>
+        </p:txBody>
+      </p:sp>
+      <p:sp>
+        <p:nvSpPr>
+          <p:cNvPr id="26" name="Rectangle: Rounded Corners 25">
+            <a:extLst>
+              <a:ext uri="{FF2B5EF4-FFF2-40B4-BE49-F238E27FC236}">
+                <a16:creationId xmlns:a16="http://schemas.microsoft.com/office/drawing/2014/main" id="{891AEB76-BF02-4A8A-888C-5C0D1FDF3C2C}"/>
+              </a:ext>
+            </a:extLst>
+          </p:cNvPr>
+          <p:cNvSpPr/>
+          <p:nvPr/>
+        </p:nvSpPr>
+        <p:spPr>
+          <a:xfrm>
+            <a:off x="8935460" y="3459277"/>
+            <a:ext cx="2590799" cy="300786"/>
+          </a:xfrm>
+          <a:prstGeom prst="roundRect">
+            <a:avLst/>
+          </a:prstGeom>
+          <a:solidFill>
+            <a:schemeClr val="bg1">
+              <a:lumMod val="50000"/>
+            </a:schemeClr>
+          </a:solidFill>
+        </p:spPr>
+        <p:style>
+          <a:lnRef idx="2">
+            <a:schemeClr val="accent1">
+              <a:shade val="50000"/>
+            </a:schemeClr>
+          </a:lnRef>
+          <a:fillRef idx="1">
+            <a:schemeClr val="accent1"/>
+          </a:fillRef>
+          <a:effectRef idx="0">
+            <a:schemeClr val="accent1"/>
+          </a:effectRef>
+          <a:fontRef idx="minor">
+            <a:schemeClr val="lt1"/>
+          </a:fontRef>
+        </p:style>
+        <p:txBody>
+          <a:bodyPr rtlCol="0" anchor="ctr"/>
+          <a:lstStyle/>
+          <a:p>
+            <a:pPr algn="ctr"/>
+            <a:r>
+              <a:rPr lang="en-US" dirty="0"/>
+              <a:t>General Use Component</a:t>
+            </a:r>
+          </a:p>
+        </p:txBody>
+      </p:sp>
+      <p:sp>
+        <p:nvSpPr>
+          <p:cNvPr id="27" name="Rectangle: Rounded Corners 26">
+            <a:extLst>
+              <a:ext uri="{FF2B5EF4-FFF2-40B4-BE49-F238E27FC236}">
+                <a16:creationId xmlns:a16="http://schemas.microsoft.com/office/drawing/2014/main" id="{533C519D-1014-42FC-AB96-B362AA2E1F45}"/>
+              </a:ext>
+            </a:extLst>
+          </p:cNvPr>
+          <p:cNvSpPr/>
+          <p:nvPr/>
+        </p:nvSpPr>
+        <p:spPr>
+          <a:xfrm>
+            <a:off x="7944857" y="5664392"/>
+            <a:ext cx="994616" cy="300786"/>
+          </a:xfrm>
+          <a:prstGeom prst="roundRect">
+            <a:avLst/>
+          </a:prstGeom>
+          <a:solidFill>
+            <a:srgbClr val="00B050"/>
+          </a:solidFill>
+        </p:spPr>
+        <p:style>
+          <a:lnRef idx="2">
+            <a:schemeClr val="accent1">
+              <a:shade val="50000"/>
+            </a:schemeClr>
+          </a:lnRef>
+          <a:fillRef idx="1">
+            <a:schemeClr val="accent1"/>
+          </a:fillRef>
+          <a:effectRef idx="0">
+            <a:schemeClr val="accent1"/>
+          </a:effectRef>
+          <a:fontRef idx="minor">
+            <a:schemeClr val="lt1"/>
+          </a:fontRef>
+        </p:style>
+        <p:txBody>
+          <a:bodyPr rtlCol="0" anchor="ctr"/>
+          <a:lstStyle/>
+          <a:p>
+            <a:pPr algn="ctr"/>
+            <a:r>
+              <a:rPr lang="en-US" dirty="0"/>
+              <a:t>Building</a:t>
+            </a:r>
+          </a:p>
+        </p:txBody>
+      </p:sp>
+      <p:sp>
+        <p:nvSpPr>
+          <p:cNvPr id="28" name="Rectangle: Rounded Corners 27">
+            <a:extLst>
+              <a:ext uri="{FF2B5EF4-FFF2-40B4-BE49-F238E27FC236}">
+                <a16:creationId xmlns:a16="http://schemas.microsoft.com/office/drawing/2014/main" id="{9C56BAD4-58C2-4EB2-81CF-CBFBEEC116F6}"/>
+              </a:ext>
+            </a:extLst>
+          </p:cNvPr>
+          <p:cNvSpPr/>
+          <p:nvPr/>
+        </p:nvSpPr>
+        <p:spPr>
+          <a:xfrm>
+            <a:off x="9392658" y="5664392"/>
+            <a:ext cx="1864896" cy="300786"/>
+          </a:xfrm>
+          <a:prstGeom prst="roundRect">
+            <a:avLst/>
+          </a:prstGeom>
+          <a:solidFill>
+            <a:schemeClr val="accent2">
+              <a:lumMod val="50000"/>
+            </a:schemeClr>
+          </a:solidFill>
+        </p:spPr>
+        <p:style>
+          <a:lnRef idx="2">
+            <a:schemeClr val="accent1">
+              <a:shade val="50000"/>
+            </a:schemeClr>
+          </a:lnRef>
+          <a:fillRef idx="1">
+            <a:schemeClr val="accent1"/>
+          </a:fillRef>
+          <a:effectRef idx="0">
+            <a:schemeClr val="accent1"/>
+          </a:effectRef>
+          <a:fontRef idx="minor">
+            <a:schemeClr val="lt1"/>
+          </a:fontRef>
+        </p:style>
+        <p:txBody>
+          <a:bodyPr rtlCol="0" anchor="ctr"/>
+          <a:lstStyle/>
+          <a:p>
+            <a:pPr algn="ctr"/>
+            <a:r>
+              <a:rPr lang="en-US" dirty="0" err="1"/>
+              <a:t>ElectricalSystem</a:t>
+            </a:r>
+            <a:endParaRPr lang="en-US" dirty="0"/>
+          </a:p>
+        </p:txBody>
+      </p:sp>
+      <p:sp>
+        <p:nvSpPr>
+          <p:cNvPr id="29" name="Rectangle: Rounded Corners 28">
+            <a:extLst>
+              <a:ext uri="{FF2B5EF4-FFF2-40B4-BE49-F238E27FC236}">
+                <a16:creationId xmlns:a16="http://schemas.microsoft.com/office/drawing/2014/main" id="{AA9980DA-F49B-4DAE-AC81-1D336C903629}"/>
+              </a:ext>
+            </a:extLst>
+          </p:cNvPr>
+          <p:cNvSpPr/>
+          <p:nvPr/>
+        </p:nvSpPr>
+        <p:spPr>
+          <a:xfrm>
+            <a:off x="8023063" y="6118563"/>
+            <a:ext cx="838204" cy="300786"/>
+          </a:xfrm>
+          <a:prstGeom prst="roundRect">
+            <a:avLst/>
+          </a:prstGeom>
+          <a:solidFill>
+            <a:schemeClr val="bg1">
+              <a:lumMod val="50000"/>
+            </a:schemeClr>
+          </a:solidFill>
+        </p:spPr>
+        <p:style>
+          <a:lnRef idx="2">
+            <a:schemeClr val="accent1">
+              <a:shade val="50000"/>
+            </a:schemeClr>
+          </a:lnRef>
+          <a:fillRef idx="1">
+            <a:schemeClr val="accent1"/>
+          </a:fillRef>
+          <a:effectRef idx="0">
+            <a:schemeClr val="accent1"/>
+          </a:effectRef>
+          <a:fontRef idx="minor">
+            <a:schemeClr val="lt1"/>
+          </a:fontRef>
+        </p:style>
+        <p:txBody>
+          <a:bodyPr rtlCol="0" anchor="ctr"/>
+          <a:lstStyle/>
+          <a:p>
+            <a:pPr algn="ctr"/>
+            <a:r>
+              <a:rPr lang="en-US" dirty="0"/>
+              <a:t>Bolt</a:t>
+            </a:r>
+          </a:p>
+        </p:txBody>
+      </p:sp>
+      <p:sp>
+        <p:nvSpPr>
+          <p:cNvPr id="30" name="Rectangle: Rounded Corners 29">
+            <a:extLst>
+              <a:ext uri="{FF2B5EF4-FFF2-40B4-BE49-F238E27FC236}">
+                <a16:creationId xmlns:a16="http://schemas.microsoft.com/office/drawing/2014/main" id="{0DA8BF49-605F-4BBC-9248-DD12512ADA7C}"/>
+              </a:ext>
+            </a:extLst>
+          </p:cNvPr>
+          <p:cNvSpPr/>
+          <p:nvPr/>
+        </p:nvSpPr>
+        <p:spPr>
+          <a:xfrm>
+            <a:off x="9651337" y="6130090"/>
+            <a:ext cx="1347538" cy="300786"/>
+          </a:xfrm>
+          <a:prstGeom prst="roundRect">
+            <a:avLst/>
+          </a:prstGeom>
+          <a:solidFill>
+            <a:srgbClr val="C00000"/>
+          </a:solidFill>
+        </p:spPr>
+        <p:style>
+          <a:lnRef idx="2">
+            <a:schemeClr val="accent1">
+              <a:shade val="50000"/>
+            </a:schemeClr>
+          </a:lnRef>
+          <a:fillRef idx="1">
+            <a:schemeClr val="accent1"/>
+          </a:fillRef>
+          <a:effectRef idx="0">
+            <a:schemeClr val="accent1"/>
+          </a:effectRef>
+          <a:fontRef idx="minor">
+            <a:schemeClr val="lt1"/>
+          </a:fontRef>
+        </p:style>
+        <p:txBody>
+          <a:bodyPr rtlCol="0" anchor="ctr"/>
+          <a:lstStyle/>
+          <a:p>
+            <a:pPr algn="ctr"/>
+            <a:r>
+              <a:rPr lang="en-US" dirty="0" err="1"/>
+              <a:t>SewerPipe</a:t>
+            </a:r>
+            <a:endParaRPr lang="en-US" dirty="0"/>
+          </a:p>
+        </p:txBody>
+      </p:sp>
+      <p:sp>
+        <p:nvSpPr>
+          <p:cNvPr id="31" name="TextBox 30">
+            <a:extLst>
+              <a:ext uri="{FF2B5EF4-FFF2-40B4-BE49-F238E27FC236}">
+                <a16:creationId xmlns:a16="http://schemas.microsoft.com/office/drawing/2014/main" id="{FF9972FC-6F71-4A18-B10C-01A3975AA5D4}"/>
+              </a:ext>
+            </a:extLst>
+          </p:cNvPr>
+          <p:cNvSpPr txBox="1"/>
+          <p:nvPr/>
+        </p:nvSpPr>
+        <p:spPr>
+          <a:xfrm>
+            <a:off x="9978167" y="1122731"/>
+            <a:ext cx="529440" cy="369332"/>
+          </a:xfrm>
+          <a:prstGeom prst="rect">
+            <a:avLst/>
+          </a:prstGeom>
+          <a:noFill/>
+        </p:spPr>
+        <p:txBody>
+          <a:bodyPr wrap="none" rtlCol="0">
+            <a:spAutoFit/>
+          </a:bodyPr>
+          <a:lstStyle/>
+          <a:p>
+            <a:r>
+              <a:rPr lang="en-US" b="1" u="sng" dirty="0"/>
+              <a:t>Key</a:t>
+            </a:r>
+          </a:p>
+        </p:txBody>
+      </p:sp>
+      <p:cxnSp>
+        <p:nvCxnSpPr>
+          <p:cNvPr id="34" name="Straight Connector 33">
+            <a:extLst>
+              <a:ext uri="{FF2B5EF4-FFF2-40B4-BE49-F238E27FC236}">
+                <a16:creationId xmlns:a16="http://schemas.microsoft.com/office/drawing/2014/main" id="{8EA6CABD-10B2-443F-B11E-97AA587CFD1B}"/>
+              </a:ext>
+            </a:extLst>
+          </p:cNvPr>
+          <p:cNvCxnSpPr>
+            <a:cxnSpLocks/>
+            <a:endCxn id="6" idx="0"/>
+          </p:cNvCxnSpPr>
+          <p:nvPr/>
+        </p:nvCxnSpPr>
+        <p:spPr>
+          <a:xfrm flipH="1">
+            <a:off x="2009268" y="4447170"/>
+            <a:ext cx="2249910" cy="747470"/>
+          </a:xfrm>
+          <a:prstGeom prst="line">
+            <a:avLst/>
+          </a:prstGeom>
+          <a:ln w="22225">
+            <a:solidFill>
+              <a:schemeClr val="tx1"/>
+            </a:solidFill>
+          </a:ln>
+        </p:spPr>
+        <p:style>
+          <a:lnRef idx="1">
+            <a:schemeClr val="accent1"/>
+          </a:lnRef>
+          <a:fillRef idx="0">
+            <a:schemeClr val="accent1"/>
+          </a:fillRef>
+          <a:effectRef idx="0">
+            <a:schemeClr val="accent1"/>
+          </a:effectRef>
+          <a:fontRef idx="minor">
+            <a:schemeClr val="tx1"/>
+          </a:fontRef>
+        </p:style>
+      </p:cxnSp>
+      <p:cxnSp>
+        <p:nvCxnSpPr>
+          <p:cNvPr id="35" name="Straight Connector 34">
+            <a:extLst>
+              <a:ext uri="{FF2B5EF4-FFF2-40B4-BE49-F238E27FC236}">
+                <a16:creationId xmlns:a16="http://schemas.microsoft.com/office/drawing/2014/main" id="{7FB6A014-629D-4208-BD17-575D72A51550}"/>
+              </a:ext>
+            </a:extLst>
+          </p:cNvPr>
+          <p:cNvCxnSpPr>
+            <a:cxnSpLocks/>
+            <a:stCxn id="12" idx="2"/>
+            <a:endCxn id="7" idx="0"/>
+          </p:cNvCxnSpPr>
+          <p:nvPr/>
+        </p:nvCxnSpPr>
+        <p:spPr>
+          <a:xfrm>
+            <a:off x="5217692" y="4441149"/>
+            <a:ext cx="511345" cy="753491"/>
+          </a:xfrm>
+          <a:prstGeom prst="line">
+            <a:avLst/>
+          </a:prstGeom>
+          <a:ln w="22225">
+            <a:solidFill>
+              <a:schemeClr val="tx1"/>
+            </a:solidFill>
+          </a:ln>
+        </p:spPr>
+        <p:style>
+          <a:lnRef idx="1">
+            <a:schemeClr val="accent1"/>
+          </a:lnRef>
+          <a:fillRef idx="0">
+            <a:schemeClr val="accent1"/>
+          </a:fillRef>
+          <a:effectRef idx="0">
+            <a:schemeClr val="accent1"/>
+          </a:effectRef>
+          <a:fontRef idx="minor">
+            <a:schemeClr val="tx1"/>
+          </a:fontRef>
+        </p:style>
+      </p:cxnSp>
+      <p:cxnSp>
+        <p:nvCxnSpPr>
+          <p:cNvPr id="38" name="Straight Connector 37">
+            <a:extLst>
+              <a:ext uri="{FF2B5EF4-FFF2-40B4-BE49-F238E27FC236}">
+                <a16:creationId xmlns:a16="http://schemas.microsoft.com/office/drawing/2014/main" id="{E9F01B72-EC91-432D-8847-4A1EB3B8581C}"/>
+              </a:ext>
+            </a:extLst>
+          </p:cNvPr>
+          <p:cNvCxnSpPr>
+            <a:cxnSpLocks/>
+            <a:stCxn id="13" idx="2"/>
+            <a:endCxn id="8" idx="0"/>
+          </p:cNvCxnSpPr>
+          <p:nvPr/>
+        </p:nvCxnSpPr>
+        <p:spPr>
+          <a:xfrm>
+            <a:off x="7509706" y="4447170"/>
+            <a:ext cx="2327026" cy="747470"/>
+          </a:xfrm>
+          <a:prstGeom prst="line">
+            <a:avLst/>
+          </a:prstGeom>
+          <a:ln w="22225">
+            <a:solidFill>
+              <a:schemeClr val="tx1"/>
+            </a:solidFill>
+          </a:ln>
+        </p:spPr>
+        <p:style>
+          <a:lnRef idx="1">
+            <a:schemeClr val="accent1"/>
+          </a:lnRef>
+          <a:fillRef idx="0">
+            <a:schemeClr val="accent1"/>
+          </a:fillRef>
+          <a:effectRef idx="0">
+            <a:schemeClr val="accent1"/>
+          </a:effectRef>
+          <a:fontRef idx="minor">
+            <a:schemeClr val="tx1"/>
+          </a:fontRef>
+        </p:style>
+      </p:cxnSp>
+      <p:cxnSp>
+        <p:nvCxnSpPr>
+          <p:cNvPr id="41" name="Straight Connector 40">
+            <a:extLst>
+              <a:ext uri="{FF2B5EF4-FFF2-40B4-BE49-F238E27FC236}">
+                <a16:creationId xmlns:a16="http://schemas.microsoft.com/office/drawing/2014/main" id="{EC96FB46-DA4B-439B-B8BF-2F1EE81C9A91}"/>
+              </a:ext>
+            </a:extLst>
+          </p:cNvPr>
+          <p:cNvCxnSpPr>
+            <a:cxnSpLocks/>
+            <a:stCxn id="10" idx="2"/>
+            <a:endCxn id="37" idx="0"/>
+          </p:cNvCxnSpPr>
+          <p:nvPr/>
+        </p:nvCxnSpPr>
+        <p:spPr>
+          <a:xfrm flipH="1">
+            <a:off x="6136113" y="1644343"/>
+            <a:ext cx="1926" cy="658557"/>
+          </a:xfrm>
+          <a:prstGeom prst="line">
+            <a:avLst/>
+          </a:prstGeom>
+          <a:ln w="22225">
+            <a:solidFill>
+              <a:schemeClr val="tx1"/>
+            </a:solidFill>
+          </a:ln>
+        </p:spPr>
+        <p:style>
+          <a:lnRef idx="1">
+            <a:schemeClr val="accent1"/>
+          </a:lnRef>
+          <a:fillRef idx="0">
+            <a:schemeClr val="accent1"/>
+          </a:fillRef>
+          <a:effectRef idx="0">
+            <a:schemeClr val="accent1"/>
+          </a:effectRef>
+          <a:fontRef idx="minor">
+            <a:schemeClr val="tx1"/>
+          </a:fontRef>
+        </p:style>
+      </p:cxnSp>
+      <p:cxnSp>
+        <p:nvCxnSpPr>
+          <p:cNvPr id="45" name="Straight Connector 44">
+            <a:extLst>
+              <a:ext uri="{FF2B5EF4-FFF2-40B4-BE49-F238E27FC236}">
+                <a16:creationId xmlns:a16="http://schemas.microsoft.com/office/drawing/2014/main" id="{06FAA23F-D521-454A-9B90-ACDB48234DA7}"/>
+              </a:ext>
+            </a:extLst>
+          </p:cNvPr>
+          <p:cNvCxnSpPr>
+            <a:cxnSpLocks/>
+            <a:stCxn id="9" idx="2"/>
+            <a:endCxn id="10" idx="0"/>
+          </p:cNvCxnSpPr>
+          <p:nvPr/>
+        </p:nvCxnSpPr>
+        <p:spPr>
+          <a:xfrm>
+            <a:off x="6138039" y="1069860"/>
+            <a:ext cx="0" cy="234603"/>
+          </a:xfrm>
+          <a:prstGeom prst="line">
+            <a:avLst/>
+          </a:prstGeom>
+          <a:ln w="22225">
+            <a:solidFill>
+              <a:schemeClr val="tx1"/>
+            </a:solidFill>
+          </a:ln>
+        </p:spPr>
+        <p:style>
+          <a:lnRef idx="1">
+            <a:schemeClr val="accent1"/>
+          </a:lnRef>
+          <a:fillRef idx="0">
+            <a:schemeClr val="accent1"/>
+          </a:fillRef>
+          <a:effectRef idx="0">
+            <a:schemeClr val="accent1"/>
+          </a:effectRef>
+          <a:fontRef idx="minor">
+            <a:schemeClr val="tx1"/>
+          </a:fontRef>
+        </p:style>
+      </p:cxnSp>
+      <p:sp>
+        <p:nvSpPr>
+          <p:cNvPr id="37" name="Rectangle: Rounded Corners 36">
+            <a:extLst>
+              <a:ext uri="{FF2B5EF4-FFF2-40B4-BE49-F238E27FC236}">
+                <a16:creationId xmlns:a16="http://schemas.microsoft.com/office/drawing/2014/main" id="{EF5A8F29-ECCC-455C-9112-D8E42F684720}"/>
+              </a:ext>
+            </a:extLst>
+          </p:cNvPr>
+          <p:cNvSpPr/>
+          <p:nvPr/>
+        </p:nvSpPr>
+        <p:spPr>
+          <a:xfrm>
+            <a:off x="3830060" y="2302900"/>
+            <a:ext cx="4612105" cy="905892"/>
+          </a:xfrm>
+          <a:prstGeom prst="roundRect">
+            <a:avLst/>
+          </a:prstGeom>
+          <a:solidFill>
+            <a:srgbClr val="00B0F0"/>
+          </a:solidFill>
+        </p:spPr>
+        <p:style>
+          <a:lnRef idx="2">
+            <a:schemeClr val="accent1">
+              <a:shade val="50000"/>
+            </a:schemeClr>
+          </a:lnRef>
+          <a:fillRef idx="1">
+            <a:schemeClr val="accent1"/>
+          </a:fillRef>
+          <a:effectRef idx="0">
+            <a:schemeClr val="accent1"/>
+          </a:effectRef>
+          <a:fontRef idx="minor">
+            <a:schemeClr val="lt1"/>
+          </a:fontRef>
+        </p:style>
+        <p:txBody>
+          <a:bodyPr rtlCol="0" anchor="t"/>
+          <a:lstStyle/>
+          <a:p>
+            <a:pPr algn="ctr"/>
+            <a:r>
+              <a:rPr lang="en-US" dirty="0" err="1"/>
+              <a:t>PhysicalModel</a:t>
+            </a:r>
+            <a:r>
+              <a:rPr lang="en-US" dirty="0"/>
+              <a:t> (“Top Model”)</a:t>
+            </a:r>
+          </a:p>
+        </p:txBody>
+      </p:sp>
+      <p:sp>
+        <p:nvSpPr>
+          <p:cNvPr id="39" name="Rectangle: Rounded Corners 38">
+            <a:extLst>
+              <a:ext uri="{FF2B5EF4-FFF2-40B4-BE49-F238E27FC236}">
+                <a16:creationId xmlns:a16="http://schemas.microsoft.com/office/drawing/2014/main" id="{BCA17DEB-A627-4733-B9B9-AF255CAAB73E}"/>
+              </a:ext>
+            </a:extLst>
+          </p:cNvPr>
+          <p:cNvSpPr/>
+          <p:nvPr/>
+        </p:nvSpPr>
+        <p:spPr>
+          <a:xfrm>
+            <a:off x="5783176" y="2760178"/>
+            <a:ext cx="625646" cy="300786"/>
+          </a:xfrm>
+          <a:prstGeom prst="roundRect">
+            <a:avLst/>
+          </a:prstGeom>
+          <a:solidFill>
+            <a:srgbClr val="7030A0"/>
+          </a:solidFill>
+        </p:spPr>
+        <p:style>
+          <a:lnRef idx="2">
+            <a:schemeClr val="accent1">
+              <a:shade val="50000"/>
+            </a:schemeClr>
+          </a:lnRef>
+          <a:fillRef idx="1">
+            <a:schemeClr val="accent1"/>
+          </a:fillRef>
+          <a:effectRef idx="0">
+            <a:schemeClr val="accent1"/>
+          </a:effectRef>
+          <a:fontRef idx="minor">
+            <a:schemeClr val="lt1"/>
+          </a:fontRef>
+        </p:style>
+        <p:txBody>
+          <a:bodyPr rtlCol="0" anchor="ctr"/>
+          <a:lstStyle/>
+          <a:p>
+            <a:pPr algn="ctr"/>
+            <a:r>
+              <a:rPr lang="en-US" dirty="0"/>
+              <a:t>Site</a:t>
+            </a:r>
+          </a:p>
+        </p:txBody>
+      </p:sp>
+      <p:cxnSp>
+        <p:nvCxnSpPr>
+          <p:cNvPr id="40" name="Straight Connector 39">
+            <a:extLst>
+              <a:ext uri="{FF2B5EF4-FFF2-40B4-BE49-F238E27FC236}">
+                <a16:creationId xmlns:a16="http://schemas.microsoft.com/office/drawing/2014/main" id="{89952A58-21C5-4C9A-B63D-95077F39865E}"/>
+              </a:ext>
+            </a:extLst>
+          </p:cNvPr>
+          <p:cNvCxnSpPr>
+            <a:cxnSpLocks/>
+            <a:stCxn id="39" idx="2"/>
+            <a:endCxn id="5" idx="0"/>
+          </p:cNvCxnSpPr>
+          <p:nvPr/>
+        </p:nvCxnSpPr>
+        <p:spPr>
+          <a:xfrm>
+            <a:off x="6095999" y="3060964"/>
+            <a:ext cx="1" cy="655293"/>
+          </a:xfrm>
+          <a:prstGeom prst="line">
+            <a:avLst/>
+          </a:prstGeom>
+          <a:ln w="22225">
+            <a:solidFill>
+              <a:schemeClr val="tx1"/>
+            </a:solidFill>
+          </a:ln>
+        </p:spPr>
+        <p:style>
+          <a:lnRef idx="1">
+            <a:schemeClr val="accent1"/>
+          </a:lnRef>
+          <a:fillRef idx="0">
+            <a:schemeClr val="accent1"/>
+          </a:fillRef>
+          <a:effectRef idx="0">
+            <a:schemeClr val="accent1"/>
+          </a:effectRef>
+          <a:fontRef idx="minor">
+            <a:schemeClr val="tx1"/>
+          </a:fontRef>
+        </p:style>
+      </p:cxnSp>
+    </p:spTree>
+    <p:extLst>
+      <p:ext uri="{BB962C8B-B14F-4D97-AF65-F5344CB8AC3E}">
+        <p14:creationId xmlns:p14="http://schemas.microsoft.com/office/powerpoint/2010/main" val="2552650441"/>
+      </p:ext>
+    </p:extLst>
+  </p:cSld>
+  <p:clrMapOvr>
+    <a:masterClrMapping/>
+  </p:clrMapOvr>
+</p:sld>
+</file>
+
+<file path=ppt/slides/slide3.xml><?xml version="1.0" encoding="utf-8"?>
+<p:sld xmlns:a="http://schemas.openxmlformats.org/drawingml/2006/main" xmlns:r="http://schemas.openxmlformats.org/officeDocument/2006/relationships" xmlns:p="http://schemas.openxmlformats.org/presentationml/2006/main">
+  <p:cSld>
+    <p:spTree>
+      <p:nvGrpSpPr>
+        <p:cNvPr id="1" name=""/>
+        <p:cNvGrpSpPr/>
+        <p:nvPr/>
+      </p:nvGrpSpPr>
+      <p:grpSpPr>
+        <a:xfrm>
+          <a:off x="0" y="0"/>
+          <a:ext cx="0" cy="0"/>
+          <a:chOff x="0" y="0"/>
+          <a:chExt cx="0" cy="0"/>
+        </a:xfrm>
+      </p:grpSpPr>
+      <p:sp>
+        <p:nvSpPr>
+          <p:cNvPr id="4" name="Rectangle: Rounded Corners 3">
+            <a:extLst>
+              <a:ext uri="{FF2B5EF4-FFF2-40B4-BE49-F238E27FC236}">
+                <a16:creationId xmlns:a16="http://schemas.microsoft.com/office/drawing/2014/main" id="{70F3223D-3DD7-4FD3-AF60-BF64BA5F6F50}"/>
+              </a:ext>
+            </a:extLst>
+          </p:cNvPr>
+          <p:cNvSpPr/>
+          <p:nvPr/>
+        </p:nvSpPr>
+        <p:spPr>
+          <a:xfrm>
             <a:off x="4299285" y="608096"/>
             <a:ext cx="3336757" cy="1532020"/>
           </a:xfrm>
@@ -5364,7 +7225,7 @@
 </p:sld>
 </file>
 
-<file path=ppt/slides/slide3.xml><?xml version="1.0" encoding="utf-8"?>
+<file path=ppt/slides/slide4.xml><?xml version="1.0" encoding="utf-8"?>
 <p:sld xmlns:a="http://schemas.openxmlformats.org/drawingml/2006/main" xmlns:r="http://schemas.openxmlformats.org/officeDocument/2006/relationships" xmlns:p="http://schemas.openxmlformats.org/presentationml/2006/main">
   <p:cSld>
     <p:spTree>

</xml_diff>